<commit_message>
Updated for typos and shit
</commit_message>
<xml_diff>
--- a/AIS - Capture the Flag PPT - Fall 2016.pptx
+++ b/AIS - Capture the Flag PPT - Fall 2016.pptx
@@ -4257,6 +4257,47 @@
           </a:p>
         </p:txBody>
       </p:sp>
+      <p:pic>
+        <p:nvPicPr>
+          <p:cNvPr id="5" name="Picture 2" descr="https://41.media.tumblr.com/8907fd473368389ade9ce6b758ae4f15/tumblr_inline_nnhzqqdiB01re968e_540.jpg"/>
+          <p:cNvPicPr>
+            <a:picLocks noChangeAspect="1" noChangeArrowheads="1"/>
+          </p:cNvPicPr>
+          <p:nvPr/>
+        </p:nvPicPr>
+        <p:blipFill>
+          <a:blip r:embed="rId4">
+            <a:extLst>
+              <a:ext uri="{28A0092B-C50C-407E-A947-70E740481C1C}">
+                <a14:useLocalDpi xmlns:a14="http://schemas.microsoft.com/office/drawing/2010/main" val="0"/>
+              </a:ext>
+            </a:extLst>
+          </a:blip>
+          <a:srcRect/>
+          <a:stretch>
+            <a:fillRect/>
+          </a:stretch>
+        </p:blipFill>
+        <p:spPr bwMode="auto">
+          <a:xfrm>
+            <a:off x="3685011" y="1163034"/>
+            <a:ext cx="5447838" cy="4476181"/>
+          </a:xfrm>
+          <a:prstGeom prst="rect">
+            <a:avLst/>
+          </a:prstGeom>
+          <a:noFill/>
+          <a:extLst>
+            <a:ext uri="{909E8E84-426E-40dd-AFC4-6F175D3DCCD1}">
+              <a14:hiddenFill xmlns:a14="http://schemas.microsoft.com/office/drawing/2010/main" xmlns="">
+                <a:solidFill>
+                  <a:srgbClr val="FFFFFF"/>
+                </a:solidFill>
+              </a14:hiddenFill>
+            </a:ext>
+          </a:extLst>
+        </p:spPr>
+      </p:pic>
     </p:spTree>
     <p:extLst>
       <p:ext uri="{BB962C8B-B14F-4D97-AF65-F5344CB8AC3E}">
@@ -4267,6 +4308,81 @@
   <p:clrMapOvr>
     <a:masterClrMapping/>
   </p:clrMapOvr>
+  <p:timing>
+    <p:tnLst>
+      <p:par>
+        <p:cTn id="1" dur="indefinite" restart="never" nodeType="tmRoot">
+          <p:childTnLst>
+            <p:seq concurrent="1" nextAc="seek">
+              <p:cTn id="2" dur="indefinite" nodeType="mainSeq">
+                <p:childTnLst>
+                  <p:par>
+                    <p:cTn id="3" fill="hold">
+                      <p:stCondLst>
+                        <p:cond delay="indefinite"/>
+                      </p:stCondLst>
+                      <p:childTnLst>
+                        <p:par>
+                          <p:cTn id="4" fill="hold">
+                            <p:stCondLst>
+                              <p:cond delay="0"/>
+                            </p:stCondLst>
+                            <p:childTnLst>
+                              <p:par>
+                                <p:cTn id="5" presetID="1" presetClass="entr" presetSubtype="0" fill="hold" nodeType="clickEffect">
+                                  <p:stCondLst>
+                                    <p:cond delay="0"/>
+                                  </p:stCondLst>
+                                  <p:childTnLst>
+                                    <p:set>
+                                      <p:cBhvr>
+                                        <p:cTn id="6" dur="1" fill="hold">
+                                          <p:stCondLst>
+                                            <p:cond delay="0"/>
+                                          </p:stCondLst>
+                                        </p:cTn>
+                                        <p:tgtEl>
+                                          <p:spTgt spid="5"/>
+                                        </p:tgtEl>
+                                        <p:attrNameLst>
+                                          <p:attrName>style.visibility</p:attrName>
+                                        </p:attrNameLst>
+                                      </p:cBhvr>
+                                      <p:to>
+                                        <p:strVal val="visible"/>
+                                      </p:to>
+                                    </p:set>
+                                  </p:childTnLst>
+                                </p:cTn>
+                              </p:par>
+                            </p:childTnLst>
+                          </p:cTn>
+                        </p:par>
+                      </p:childTnLst>
+                    </p:cTn>
+                  </p:par>
+                </p:childTnLst>
+              </p:cTn>
+              <p:prevCondLst>
+                <p:cond evt="onPrev" delay="0">
+                  <p:tgtEl>
+                    <p:sldTgt/>
+                  </p:tgtEl>
+                </p:cond>
+              </p:prevCondLst>
+              <p:nextCondLst>
+                <p:cond evt="onNext" delay="0">
+                  <p:tgtEl>
+                    <p:sldTgt/>
+                  </p:tgtEl>
+                </p:cond>
+              </p:nextCondLst>
+            </p:seq>
+          </p:childTnLst>
+        </p:cTn>
+      </p:par>
+    </p:tnLst>
+  </p:timing>
 </p:sld>
 </file>
 
@@ -4657,7 +4773,7 @@
         <p:spPr>
           <a:xfrm>
             <a:off x="594534" y="1050566"/>
-            <a:ext cx="8085221" cy="4524315"/>
+            <a:ext cx="8085221" cy="4154984"/>
           </a:xfrm>
           <a:prstGeom prst="rect">
             <a:avLst/>
@@ -4823,7 +4939,7 @@
                 <a:latin typeface="BatangChe" panose="02030609000101010101" pitchFamily="49" charset="-127"/>
                 <a:ea typeface="BatangChe" panose="02030609000101010101" pitchFamily="49" charset="-127"/>
               </a:rPr>
-              <a:t>There’s on a note on the desktop. You need it.</a:t>
+              <a:t>There’s a note on the desktop. You need it.</a:t>
             </a:r>
           </a:p>
         </p:txBody>
@@ -4897,7 +5013,7 @@
         <p:spPr>
           <a:xfrm>
             <a:off x="750651" y="961354"/>
-            <a:ext cx="8085221" cy="4893647"/>
+            <a:ext cx="8085221" cy="4524315"/>
           </a:xfrm>
           <a:prstGeom prst="rect">
             <a:avLst/>
@@ -5046,7 +5162,7 @@
                 <a:latin typeface="BatangChe" panose="02030609000101010101" pitchFamily="49" charset="-127"/>
                 <a:ea typeface="BatangChe" panose="02030609000101010101" pitchFamily="49" charset="-127"/>
               </a:rPr>
-              <a:t>There’s on a note on the desktop. You need it.</a:t>
+              <a:t>There’s a note on the desktop. You need it.</a:t>
             </a:r>
           </a:p>
           <a:p>
@@ -5140,7 +5256,7 @@
         <p:spPr>
           <a:xfrm>
             <a:off x="572231" y="805621"/>
-            <a:ext cx="8085221" cy="4893647"/>
+            <a:ext cx="8085221" cy="4524315"/>
           </a:xfrm>
           <a:prstGeom prst="rect">
             <a:avLst/>
@@ -5292,7 +5408,7 @@
                 <a:latin typeface="BatangChe" panose="02030609000101010101" pitchFamily="49" charset="-127"/>
                 <a:ea typeface="BatangChe" panose="02030609000101010101" pitchFamily="49" charset="-127"/>
               </a:rPr>
-              <a:t>There’s on a note on the desktop. You need it.</a:t>
+              <a:t>There’s a note on the desktop. You need it.</a:t>
             </a:r>
           </a:p>
           <a:p>
@@ -9200,6 +9316,15 @@
 </file>
 
 <file path=customXml/item2.xml><?xml version="1.0" encoding="utf-8"?>
+<?mso-contentType ?>
+<FormTemplates xmlns="http://schemas.microsoft.com/sharepoint/v3/contenttype/forms">
+  <Display>DocumentLibraryForm</Display>
+  <Edit>DocumentLibraryForm</Edit>
+  <New>DocumentLibraryForm</New>
+</FormTemplates>
+</file>
+
+<file path=customXml/item3.xml><?xml version="1.0" encoding="utf-8"?>
 <ct:contentTypeSchema xmlns:ct="http://schemas.microsoft.com/office/2006/metadata/contentType" xmlns:ma="http://schemas.microsoft.com/office/2006/metadata/properties/metaAttributes" ct:_="" ma:_="" ma:contentTypeName="Document" ma:contentTypeID="0x0101007987DCF4BC60F44CBC5439F846B58D18" ma:contentTypeVersion="1" ma:contentTypeDescription="Create a new document." ma:contentTypeScope="" ma:versionID="c294aae3766195dc625b4a4aca4e9765">
   <xsd:schema xmlns:xsd="http://www.w3.org/2001/XMLSchema" xmlns:xs="http://www.w3.org/2001/XMLSchema" xmlns:p="http://schemas.microsoft.com/office/2006/metadata/properties" xmlns:ns1="http://schemas.microsoft.com/sharepoint/v3" targetNamespace="http://schemas.microsoft.com/office/2006/metadata/properties" ma:root="true" ma:fieldsID="4dcce58c87e9fcebab8021569449a8d0" ns1:_="">
     <xsd:import namespace="http://schemas.microsoft.com/sharepoint/v3"/>
@@ -9331,15 +9456,6 @@
 </ct:contentTypeSchema>
 </file>
 
-<file path=customXml/item3.xml><?xml version="1.0" encoding="utf-8"?>
-<?mso-contentType ?>
-<FormTemplates xmlns="http://schemas.microsoft.com/sharepoint/v3/contenttype/forms">
-  <Display>DocumentLibraryForm</Display>
-  <Edit>DocumentLibraryForm</Edit>
-  <New>DocumentLibraryForm</New>
-</FormTemplates>
-</file>
-
 <file path=customXml/itemProps1.xml><?xml version="1.0" encoding="utf-8"?>
 <ds:datastoreItem xmlns:ds="http://schemas.openxmlformats.org/officeDocument/2006/customXml" ds:itemID="{7B4F6684-A7BF-4E65-B1D2-8F985151B567}">
   <ds:schemaRefs>
@@ -9357,6 +9473,14 @@
 </file>
 
 <file path=customXml/itemProps2.xml><?xml version="1.0" encoding="utf-8"?>
+<ds:datastoreItem xmlns:ds="http://schemas.openxmlformats.org/officeDocument/2006/customXml" ds:itemID="{0F7372DD-D37F-48DF-99BF-17BA863CF3B1}">
+  <ds:schemaRefs>
+    <ds:schemaRef ds:uri="http://schemas.microsoft.com/sharepoint/v3/contenttype/forms"/>
+  </ds:schemaRefs>
+</ds:datastoreItem>
+</file>
+
+<file path=customXml/itemProps3.xml><?xml version="1.0" encoding="utf-8"?>
 <ds:datastoreItem xmlns:ds="http://schemas.openxmlformats.org/officeDocument/2006/customXml" ds:itemID="{E17C3DD1-1A20-438F-8DEA-90CF8165430F}">
   <ds:schemaRefs>
     <ds:schemaRef ds:uri="http://schemas.microsoft.com/office/2006/metadata/contentType"/>
@@ -9372,12 +9496,4 @@
     <ds:schemaRef ds:uri="http://schemas.microsoft.com/internal/obd"/>
   </ds:schemaRefs>
 </ds:datastoreItem>
-</file>
-
-<file path=customXml/itemProps3.xml><?xml version="1.0" encoding="utf-8"?>
-<ds:datastoreItem xmlns:ds="http://schemas.openxmlformats.org/officeDocument/2006/customXml" ds:itemID="{0F7372DD-D37F-48DF-99BF-17BA863CF3B1}">
-  <ds:schemaRefs>
-    <ds:schemaRef ds:uri="http://schemas.microsoft.com/sharepoint/v3/contenttype/forms"/>
-  </ds:schemaRefs>
-</ds:datastoreItem>
 </file>
</xml_diff>